<commit_message>
Added ml and dl sections
</commit_message>
<xml_diff>
--- a/ConventionalMachineLearning/MachineLearning.pptx
+++ b/ConventionalMachineLearning/MachineLearning.pptx
@@ -6,10 +6,9 @@
   </p:sldMasterIdLst>
   <p:sldIdLst>
     <p:sldId id="256" r:id="rId2"/>
-    <p:sldId id="267" r:id="rId3"/>
-    <p:sldId id="269" r:id="rId4"/>
-    <p:sldId id="268" r:id="rId5"/>
-    <p:sldId id="265" r:id="rId6"/>
+    <p:sldId id="269" r:id="rId3"/>
+    <p:sldId id="268" r:id="rId4"/>
+    <p:sldId id="265" r:id="rId5"/>
   </p:sldIdLst>
   <p:sldSz cx="12192000" cy="6858000"/>
   <p:notesSz cx="6858000" cy="9144000"/>
@@ -540,36 +539,6 @@
           </a:p>
         </p:txBody>
       </p:sp>
-      <p:pic>
-        <p:nvPicPr>
-          <p:cNvPr id="7" name="Picture 6">
-            <a:extLst>
-              <a:ext uri="{FF2B5EF4-FFF2-40B4-BE49-F238E27FC236}">
-                <a16:creationId xmlns:a16="http://schemas.microsoft.com/office/drawing/2014/main" id="{AC04683E-95F0-A94A-8D0C-6B1DD7C18E13}"/>
-              </a:ext>
-            </a:extLst>
-          </p:cNvPr>
-          <p:cNvPicPr>
-            <a:picLocks noChangeAspect="1"/>
-          </p:cNvPicPr>
-          <p:nvPr/>
-        </p:nvPicPr>
-        <p:blipFill>
-          <a:blip r:embed="rId2"/>
-          <a:stretch>
-            <a:fillRect/>
-          </a:stretch>
-        </p:blipFill>
-        <p:spPr>
-          <a:xfrm>
-            <a:off x="1130463" y="1309833"/>
-            <a:ext cx="4117040" cy="668472"/>
-          </a:xfrm>
-          <a:prstGeom prst="rect">
-            <a:avLst/>
-          </a:prstGeom>
-        </p:spPr>
-      </p:pic>
     </p:spTree>
     <p:extLst>
       <p:ext uri="{BB962C8B-B14F-4D97-AF65-F5344CB8AC3E}">
@@ -5091,36 +5060,6 @@
           </a:p>
         </p:txBody>
       </p:sp>
-      <p:pic>
-        <p:nvPicPr>
-          <p:cNvPr id="9" name="Picture 8">
-            <a:extLst>
-              <a:ext uri="{FF2B5EF4-FFF2-40B4-BE49-F238E27FC236}">
-                <a16:creationId xmlns:a16="http://schemas.microsoft.com/office/drawing/2014/main" id="{51BB529B-6D1E-7A45-AE36-F7546910C851}"/>
-              </a:ext>
-            </a:extLst>
-          </p:cNvPr>
-          <p:cNvPicPr>
-            <a:picLocks noChangeAspect="1"/>
-          </p:cNvPicPr>
-          <p:nvPr/>
-        </p:nvPicPr>
-        <p:blipFill>
-          <a:blip r:embed="rId3"/>
-          <a:stretch>
-            <a:fillRect/>
-          </a:stretch>
-        </p:blipFill>
-        <p:spPr>
-          <a:xfrm>
-            <a:off x="1130463" y="1309833"/>
-            <a:ext cx="4117040" cy="668472"/>
-          </a:xfrm>
-          <a:prstGeom prst="rect">
-            <a:avLst/>
-          </a:prstGeom>
-        </p:spPr>
-      </p:pic>
     </p:spTree>
     <p:extLst>
       <p:ext uri="{BB962C8B-B14F-4D97-AF65-F5344CB8AC3E}">
@@ -5532,36 +5471,6 @@
           </a:p>
         </p:txBody>
       </p:sp>
-      <p:pic>
-        <p:nvPicPr>
-          <p:cNvPr id="10" name="Picture 9">
-            <a:extLst>
-              <a:ext uri="{FF2B5EF4-FFF2-40B4-BE49-F238E27FC236}">
-                <a16:creationId xmlns:a16="http://schemas.microsoft.com/office/drawing/2014/main" id="{66632BDE-23C9-1544-81D1-52C3E5F342B3}"/>
-              </a:ext>
-            </a:extLst>
-          </p:cNvPr>
-          <p:cNvPicPr>
-            <a:picLocks noChangeAspect="1"/>
-          </p:cNvPicPr>
-          <p:nvPr/>
-        </p:nvPicPr>
-        <p:blipFill>
-          <a:blip r:embed="rId2"/>
-          <a:stretch>
-            <a:fillRect/>
-          </a:stretch>
-        </p:blipFill>
-        <p:spPr>
-          <a:xfrm>
-            <a:off x="1196613" y="1291333"/>
-            <a:ext cx="4117040" cy="668472"/>
-          </a:xfrm>
-          <a:prstGeom prst="rect">
-            <a:avLst/>
-          </a:prstGeom>
-        </p:spPr>
-      </p:pic>
     </p:spTree>
     <p:extLst>
       <p:ext uri="{BB962C8B-B14F-4D97-AF65-F5344CB8AC3E}">
@@ -6310,42 +6219,6 @@
           <a:chExt cx="0" cy="0"/>
         </a:xfrm>
       </p:grpSpPr>
-      <p:pic>
-        <p:nvPicPr>
-          <p:cNvPr id="5" name="Picture 4">
-            <a:extLst>
-              <a:ext uri="{FF2B5EF4-FFF2-40B4-BE49-F238E27FC236}">
-                <a16:creationId xmlns:a16="http://schemas.microsoft.com/office/drawing/2014/main" id="{4BF268A6-3784-A747-A256-BD21081DBD04}"/>
-              </a:ext>
-            </a:extLst>
-          </p:cNvPr>
-          <p:cNvPicPr>
-            <a:picLocks noChangeAspect="1"/>
-          </p:cNvPicPr>
-          <p:nvPr/>
-        </p:nvPicPr>
-        <p:blipFill>
-          <a:blip r:embed="rId2">
-            <a:extLst>
-              <a:ext uri="{28A0092B-C50C-407E-A947-70E740481C1C}">
-                <a14:useLocalDpi xmlns:a14="http://schemas.microsoft.com/office/drawing/2010/main" val="0"/>
-              </a:ext>
-            </a:extLst>
-          </a:blip>
-          <a:stretch>
-            <a:fillRect/>
-          </a:stretch>
-        </p:blipFill>
-        <p:spPr>
-          <a:xfrm>
-            <a:off x="0" y="0"/>
-            <a:ext cx="12192000" cy="6858000"/>
-          </a:xfrm>
-          <a:prstGeom prst="rect">
-            <a:avLst/>
-          </a:prstGeom>
-        </p:spPr>
-      </p:pic>
       <p:sp>
         <p:nvSpPr>
           <p:cNvPr id="4" name="Slide Number Placeholder 3"/>
@@ -6897,36 +6770,6 @@
           </a:p>
         </p:txBody>
       </p:sp>
-      <p:pic>
-        <p:nvPicPr>
-          <p:cNvPr id="6" name="Picture 5">
-            <a:extLst>
-              <a:ext uri="{FF2B5EF4-FFF2-40B4-BE49-F238E27FC236}">
-                <a16:creationId xmlns:a16="http://schemas.microsoft.com/office/drawing/2014/main" id="{0682101E-6181-D445-8991-D581E4F2C50F}"/>
-              </a:ext>
-            </a:extLst>
-          </p:cNvPr>
-          <p:cNvPicPr>
-            <a:picLocks noChangeAspect="1"/>
-          </p:cNvPicPr>
-          <p:nvPr/>
-        </p:nvPicPr>
-        <p:blipFill>
-          <a:blip r:embed="rId2"/>
-          <a:stretch>
-            <a:fillRect/>
-          </a:stretch>
-        </p:blipFill>
-        <p:spPr>
-          <a:xfrm>
-            <a:off x="1130463" y="1309833"/>
-            <a:ext cx="4117040" cy="668472"/>
-          </a:xfrm>
-          <a:prstGeom prst="rect">
-            <a:avLst/>
-          </a:prstGeom>
-        </p:spPr>
-      </p:pic>
     </p:spTree>
     <p:extLst>
       <p:ext uri="{BB962C8B-B14F-4D97-AF65-F5344CB8AC3E}">
@@ -7086,36 +6929,6 @@
           </a:p>
         </p:txBody>
       </p:sp>
-      <p:pic>
-        <p:nvPicPr>
-          <p:cNvPr id="6" name="Picture 5">
-            <a:extLst>
-              <a:ext uri="{FF2B5EF4-FFF2-40B4-BE49-F238E27FC236}">
-                <a16:creationId xmlns:a16="http://schemas.microsoft.com/office/drawing/2014/main" id="{42C91AB4-7E4D-D449-A2D1-D9EEF381AAD2}"/>
-              </a:ext>
-            </a:extLst>
-          </p:cNvPr>
-          <p:cNvPicPr>
-            <a:picLocks noChangeAspect="1"/>
-          </p:cNvPicPr>
-          <p:nvPr/>
-        </p:nvPicPr>
-        <p:blipFill>
-          <a:blip r:embed="rId3"/>
-          <a:stretch>
-            <a:fillRect/>
-          </a:stretch>
-        </p:blipFill>
-        <p:spPr>
-          <a:xfrm>
-            <a:off x="1130463" y="1309833"/>
-            <a:ext cx="4117040" cy="668472"/>
-          </a:xfrm>
-          <a:prstGeom prst="rect">
-            <a:avLst/>
-          </a:prstGeom>
-        </p:spPr>
-      </p:pic>
     </p:spTree>
     <p:extLst>
       <p:ext uri="{BB962C8B-B14F-4D97-AF65-F5344CB8AC3E}">
@@ -8005,89 +7818,6 @@
               <a:t>‹#›</a:t>
             </a:fld>
             <a:endParaRPr lang="en-US"/>
-          </a:p>
-        </p:txBody>
-      </p:sp>
-      <p:pic>
-        <p:nvPicPr>
-          <p:cNvPr id="13" name="Picture 12">
-            <a:extLst>
-              <a:ext uri="{FF2B5EF4-FFF2-40B4-BE49-F238E27FC236}">
-                <a16:creationId xmlns:a16="http://schemas.microsoft.com/office/drawing/2014/main" id="{F203CFAF-CE88-D649-8148-F796F5DAB431}"/>
-              </a:ext>
-            </a:extLst>
-          </p:cNvPr>
-          <p:cNvPicPr>
-            <a:picLocks noChangeAspect="1"/>
-          </p:cNvPicPr>
-          <p:nvPr/>
-        </p:nvPicPr>
-        <p:blipFill>
-          <a:blip r:embed="rId29"/>
-          <a:stretch>
-            <a:fillRect/>
-          </a:stretch>
-        </p:blipFill>
-        <p:spPr>
-          <a:xfrm>
-            <a:off x="392521" y="379143"/>
-            <a:ext cx="3834404" cy="383440"/>
-          </a:xfrm>
-          <a:prstGeom prst="rect">
-            <a:avLst/>
-          </a:prstGeom>
-        </p:spPr>
-      </p:pic>
-      <p:sp>
-        <p:nvSpPr>
-          <p:cNvPr id="14" name="TextBox 13">
-            <a:extLst>
-              <a:ext uri="{FF2B5EF4-FFF2-40B4-BE49-F238E27FC236}">
-                <a16:creationId xmlns:a16="http://schemas.microsoft.com/office/drawing/2014/main" id="{4AB210C7-6FF6-304A-A26A-1CBE3975D0AB}"/>
-              </a:ext>
-            </a:extLst>
-          </p:cNvPr>
-          <p:cNvSpPr txBox="1"/>
-          <p:nvPr/>
-        </p:nvSpPr>
-        <p:spPr>
-          <a:xfrm>
-            <a:off x="553425" y="6448927"/>
-            <a:ext cx="3578088" cy="215444"/>
-          </a:xfrm>
-          <a:prstGeom prst="rect">
-            <a:avLst/>
-          </a:prstGeom>
-          <a:noFill/>
-        </p:spPr>
-        <p:txBody>
-          <a:bodyPr wrap="square" rtlCol="0">
-            <a:spAutoFit/>
-          </a:bodyPr>
-          <a:lstStyle/>
-          <a:p>
-            <a:r>
-              <a:rPr lang="en-US" sz="800" b="0" i="0" u="none" strike="noStrike" kern="1200" dirty="0">
-                <a:solidFill>
-                  <a:schemeClr val="bg1">
-                    <a:lumMod val="50000"/>
-                  </a:schemeClr>
-                </a:solidFill>
-                <a:effectLst/>
-                <a:latin typeface="+mn-lt"/>
-                <a:ea typeface="+mn-ea"/>
-                <a:cs typeface="+mn-cs"/>
-              </a:rPr>
-              <a:t>TEKsystems Global Services, LLC © ALL RIGHTS RESERVED. </a:t>
-            </a:r>
-            <a:endParaRPr lang="en-US" sz="133" dirty="0">
-              <a:solidFill>
-                <a:schemeClr val="bg1">
-                  <a:lumMod val="50000"/>
-                </a:schemeClr>
-              </a:solidFill>
-              <a:latin typeface="Calibri" panose="020F0502020204030204"/>
-            </a:endParaRPr>
           </a:p>
         </p:txBody>
       </p:sp>
@@ -8547,53 +8277,6 @@
       </p:sp>
       <p:pic>
         <p:nvPicPr>
-          <p:cNvPr id="5" name="Picture 2" descr="Image result for allegis logo">
-            <a:extLst>
-              <a:ext uri="{FF2B5EF4-FFF2-40B4-BE49-F238E27FC236}">
-                <a16:creationId xmlns:a16="http://schemas.microsoft.com/office/drawing/2014/main" id="{E9780589-76DD-4342-A1E0-58A45DD2B9C6}"/>
-              </a:ext>
-            </a:extLst>
-          </p:cNvPr>
-          <p:cNvPicPr>
-            <a:picLocks noChangeAspect="1" noChangeArrowheads="1"/>
-          </p:cNvPicPr>
-          <p:nvPr/>
-        </p:nvPicPr>
-        <p:blipFill>
-          <a:blip r:embed="rId2">
-            <a:extLst>
-              <a:ext uri="{28A0092B-C50C-407E-A947-70E740481C1C}">
-                <a14:useLocalDpi xmlns:a14="http://schemas.microsoft.com/office/drawing/2010/main" val="0"/>
-              </a:ext>
-            </a:extLst>
-          </a:blip>
-          <a:srcRect/>
-          <a:stretch>
-            <a:fillRect/>
-          </a:stretch>
-        </p:blipFill>
-        <p:spPr bwMode="auto">
-          <a:xfrm>
-            <a:off x="10360623" y="6172434"/>
-            <a:ext cx="750694" cy="674674"/>
-          </a:xfrm>
-          <a:prstGeom prst="rect">
-            <a:avLst/>
-          </a:prstGeom>
-          <a:noFill/>
-          <a:extLst>
-            <a:ext uri="{909E8E84-426E-40DD-AFC4-6F175D3DCCD1}">
-              <a14:hiddenFill xmlns:a14="http://schemas.microsoft.com/office/drawing/2010/main">
-                <a:solidFill>
-                  <a:srgbClr val="FFFFFF"/>
-                </a:solidFill>
-              </a14:hiddenFill>
-            </a:ext>
-          </a:extLst>
-        </p:spPr>
-      </p:pic>
-      <p:pic>
-        <p:nvPicPr>
           <p:cNvPr id="6" name="Picture Placeholder 4" descr="A picture containing web&#10;&#10;Description generated with high confidence">
             <a:extLst>
               <a:ext uri="{FF2B5EF4-FFF2-40B4-BE49-F238E27FC236}">
@@ -8607,7 +8290,7 @@
           <p:nvPr/>
         </p:nvPicPr>
         <p:blipFill>
-          <a:blip r:embed="rId3"/>
+          <a:blip r:embed="rId2"/>
           <a:srcRect t="69" b="69"/>
           <a:stretch>
             <a:fillRect/>
@@ -8838,7 +8521,7 @@
           <p:cNvPr id="2" name="Title 1">
             <a:extLst>
               <a:ext uri="{FF2B5EF4-FFF2-40B4-BE49-F238E27FC236}">
-                <a16:creationId xmlns:a16="http://schemas.microsoft.com/office/drawing/2014/main" id="{FD3D927D-05CD-42C4-8839-D30EFB6A4BAB}"/>
+                <a16:creationId xmlns:a16="http://schemas.microsoft.com/office/drawing/2014/main" id="{89E96B56-1701-4410-8683-CC1B82ACDF7A}"/>
               </a:ext>
             </a:extLst>
           </p:cNvPr>
@@ -8849,204 +8532,71 @@
             <p:ph type="title"/>
           </p:nvPr>
         </p:nvSpPr>
-        <p:spPr>
-          <a:xfrm>
-            <a:off x="419100" y="924136"/>
-            <a:ext cx="11353800" cy="570189"/>
-          </a:xfrm>
-        </p:spPr>
+        <p:spPr/>
         <p:txBody>
           <a:bodyPr/>
           <a:lstStyle/>
           <a:p>
             <a:r>
-              <a:rPr lang="en-US" b="1" dirty="0"/>
-              <a:t>Agenda</a:t>
-            </a:r>
-          </a:p>
-        </p:txBody>
-      </p:sp>
-      <p:sp>
-        <p:nvSpPr>
-          <p:cNvPr id="3" name="Content Placeholder 2">
+              <a:rPr lang="en-US" dirty="0"/>
+              <a:t>Precision vs. Recall</a:t>
+            </a:r>
+          </a:p>
+        </p:txBody>
+      </p:sp>
+      <p:pic>
+        <p:nvPicPr>
+          <p:cNvPr id="4" name="Picture 8" descr="Image result for precision vs. recall">
             <a:extLst>
               <a:ext uri="{FF2B5EF4-FFF2-40B4-BE49-F238E27FC236}">
-                <a16:creationId xmlns:a16="http://schemas.microsoft.com/office/drawing/2014/main" id="{0825F960-6961-451A-83F1-1473D1A52F5C}"/>
-              </a:ext>
-            </a:extLst>
-          </p:cNvPr>
-          <p:cNvSpPr>
-            <a:spLocks noGrp="1"/>
-          </p:cNvSpPr>
-          <p:nvPr>
-            <p:ph idx="1"/>
-          </p:nvPr>
-        </p:nvSpPr>
-        <p:spPr>
-          <a:xfrm>
-            <a:off x="419100" y="1494325"/>
-            <a:ext cx="11349739" cy="4878195"/>
-          </a:xfrm>
-        </p:spPr>
-        <p:txBody>
-          <a:bodyPr>
-            <a:normAutofit lnSpcReduction="10000"/>
-          </a:bodyPr>
-          <a:lstStyle/>
-          <a:p>
-            <a:r>
-              <a:rPr lang="en-US" sz="2400" dirty="0"/>
-              <a:t>Background and Motivation</a:t>
-            </a:r>
-          </a:p>
-          <a:p>
-            <a:pPr lvl="1"/>
-            <a:r>
-              <a:rPr lang="en-US" sz="2400" dirty="0"/>
-              <a:t>Job description classification &amp; bill rate prediction</a:t>
-            </a:r>
-          </a:p>
-          <a:p>
-            <a:pPr lvl="1"/>
-            <a:r>
-              <a:rPr lang="en-US" sz="2400" dirty="0"/>
-              <a:t>Existing approach and issues</a:t>
-            </a:r>
-          </a:p>
-          <a:p>
-            <a:r>
-              <a:rPr lang="en-US" sz="2400" dirty="0"/>
-              <a:t>Assessments and Solutions</a:t>
-            </a:r>
-          </a:p>
-          <a:p>
-            <a:pPr lvl="1"/>
-            <a:r>
-              <a:rPr lang="en-US" sz="2400" dirty="0"/>
-              <a:t>Word2Vec for feature extraction</a:t>
-            </a:r>
-          </a:p>
-          <a:p>
-            <a:pPr lvl="1"/>
-            <a:r>
-              <a:rPr lang="en-US" sz="2400" dirty="0"/>
-              <a:t>Deep neural network for learning</a:t>
-            </a:r>
-          </a:p>
-          <a:p>
-            <a:r>
-              <a:rPr lang="en-US" sz="2400" dirty="0"/>
-              <a:t>Implementation and Results</a:t>
-            </a:r>
-          </a:p>
-          <a:p>
-            <a:r>
-              <a:rPr lang="en-US" sz="2400" dirty="0"/>
-              <a:t>Principles and Best Practices</a:t>
-            </a:r>
-          </a:p>
-          <a:p>
-            <a:r>
-              <a:rPr lang="en-US" sz="2400" dirty="0"/>
-              <a:t>Demo</a:t>
-            </a:r>
-          </a:p>
-          <a:p>
-            <a:r>
-              <a:rPr lang="en-US" sz="2400" dirty="0"/>
-              <a:t>Q &amp; A</a:t>
-            </a:r>
-          </a:p>
-        </p:txBody>
-      </p:sp>
-      <p:pic>
-        <p:nvPicPr>
-          <p:cNvPr id="4" name="Picture Placeholder 18">
-            <a:extLst>
-              <a:ext uri="{FF2B5EF4-FFF2-40B4-BE49-F238E27FC236}">
-                <a16:creationId xmlns:a16="http://schemas.microsoft.com/office/drawing/2014/main" id="{4FC917E7-E8AD-4555-97ED-24F25307D972}"/>
+                <a16:creationId xmlns:a16="http://schemas.microsoft.com/office/drawing/2014/main" id="{7E34FF77-591C-48DA-A38D-130D1851E288}"/>
               </a:ext>
             </a:extLst>
           </p:cNvPr>
           <p:cNvPicPr>
-            <a:picLocks noChangeAspect="1"/>
+            <a:picLocks noGrp="1" noChangeAspect="1" noChangeArrowheads="1"/>
           </p:cNvPicPr>
-          <p:nvPr/>
+          <p:nvPr>
+            <p:ph idx="1"/>
+          </p:nvPr>
         </p:nvPicPr>
         <p:blipFill>
-          <a:blip r:embed="rId2"/>
-          <a:srcRect l="22798" r="22798"/>
+          <a:blip r:embed="rId2">
+            <a:extLst>
+              <a:ext uri="{28A0092B-C50C-407E-A947-70E740481C1C}">
+                <a14:useLocalDpi xmlns:a14="http://schemas.microsoft.com/office/drawing/2010/main" val="0"/>
+              </a:ext>
+            </a:extLst>
+          </a:blip>
+          <a:srcRect/>
           <a:stretch>
             <a:fillRect/>
           </a:stretch>
         </p:blipFill>
-        <p:spPr>
-          <a:xfrm>
-            <a:off x="8668725" y="0"/>
-            <a:ext cx="3523275" cy="4312511"/>
-          </a:xfrm>
-          <a:custGeom>
+        <p:spPr bwMode="auto">
+          <a:xfrm>
+            <a:off x="2604339" y="1493838"/>
+            <a:ext cx="6978559" cy="4351337"/>
+          </a:xfrm>
+          <a:prstGeom prst="rect">
             <a:avLst/>
-            <a:gdLst>
-              <a:gd name="connsiteX0" fmla="*/ 0 w 3523275"/>
-              <a:gd name="connsiteY0" fmla="*/ 0 h 4312511"/>
-              <a:gd name="connsiteX1" fmla="*/ 3523275 w 3523275"/>
-              <a:gd name="connsiteY1" fmla="*/ 0 h 4312511"/>
-              <a:gd name="connsiteX2" fmla="*/ 3523275 w 3523275"/>
-              <a:gd name="connsiteY2" fmla="*/ 4310873 h 4312511"/>
-              <a:gd name="connsiteX3" fmla="*/ 3073650 w 3523275"/>
-              <a:gd name="connsiteY3" fmla="*/ 4312511 h 4312511"/>
-              <a:gd name="connsiteX4" fmla="*/ 2122134 w 3523275"/>
-              <a:gd name="connsiteY4" fmla="*/ 3681803 h 4312511"/>
-            </a:gdLst>
-            <a:ahLst/>
-            <a:cxnLst>
-              <a:cxn ang="0">
-                <a:pos x="connsiteX0" y="connsiteY0"/>
-              </a:cxn>
-              <a:cxn ang="0">
-                <a:pos x="connsiteX1" y="connsiteY1"/>
-              </a:cxn>
-              <a:cxn ang="0">
-                <a:pos x="connsiteX2" y="connsiteY2"/>
-              </a:cxn>
-              <a:cxn ang="0">
-                <a:pos x="connsiteX3" y="connsiteY3"/>
-              </a:cxn>
-              <a:cxn ang="0">
-                <a:pos x="connsiteX4" y="connsiteY4"/>
-              </a:cxn>
-            </a:cxnLst>
-            <a:rect l="l" t="t" r="r" b="b"/>
-            <a:pathLst>
-              <a:path w="3523275" h="4312511">
-                <a:moveTo>
-                  <a:pt x="0" y="0"/>
-                </a:moveTo>
-                <a:lnTo>
-                  <a:pt x="3523275" y="0"/>
-                </a:lnTo>
-                <a:lnTo>
-                  <a:pt x="3523275" y="4310873"/>
-                </a:lnTo>
-                <a:lnTo>
-                  <a:pt x="3073650" y="4312511"/>
-                </a:lnTo>
-                <a:cubicBezTo>
-                  <a:pt x="2645905" y="4312511"/>
-                  <a:pt x="2329701" y="4112769"/>
-                  <a:pt x="2122134" y="3681803"/>
-                </a:cubicBezTo>
-                <a:close/>
-              </a:path>
-            </a:pathLst>
-          </a:custGeom>
+          </a:prstGeom>
+          <a:noFill/>
+          <a:extLst>
+            <a:ext uri="{909E8E84-426E-40DD-AFC4-6F175D3DCCD1}">
+              <a14:hiddenFill xmlns:a14="http://schemas.microsoft.com/office/drawing/2010/main">
+                <a:solidFill>
+                  <a:srgbClr val="FFFFFF"/>
+                </a:solidFill>
+              </a14:hiddenFill>
+            </a:ext>
+          </a:extLst>
         </p:spPr>
       </p:pic>
     </p:spTree>
     <p:extLst>
       <p:ext uri="{BB962C8B-B14F-4D97-AF65-F5344CB8AC3E}">
-        <p14:creationId xmlns:p14="http://schemas.microsoft.com/office/powerpoint/2010/main" val="188288804"/>
+        <p14:creationId xmlns:p14="http://schemas.microsoft.com/office/powerpoint/2010/main" val="790890651"/>
       </p:ext>
     </p:extLst>
   </p:cSld>
@@ -9078,7 +8628,7 @@
           <p:cNvPr id="2" name="Title 1">
             <a:extLst>
               <a:ext uri="{FF2B5EF4-FFF2-40B4-BE49-F238E27FC236}">
-                <a16:creationId xmlns:a16="http://schemas.microsoft.com/office/drawing/2014/main" id="{89E96B56-1701-4410-8683-CC1B82ACDF7A}"/>
+                <a16:creationId xmlns:a16="http://schemas.microsoft.com/office/drawing/2014/main" id="{0B62DCEB-3B64-4904-B9C1-F4D299416AFC}"/>
               </a:ext>
             </a:extLst>
           </p:cNvPr>
@@ -9103,10 +8653,10 @@
       </p:sp>
       <p:pic>
         <p:nvPicPr>
-          <p:cNvPr id="4" name="Picture 8" descr="Image result for precision vs. recall">
+          <p:cNvPr id="1026" name="Picture 2" descr="enter image description here">
             <a:extLst>
               <a:ext uri="{FF2B5EF4-FFF2-40B4-BE49-F238E27FC236}">
-                <a16:creationId xmlns:a16="http://schemas.microsoft.com/office/drawing/2014/main" id="{7E34FF77-591C-48DA-A38D-130D1851E288}"/>
+                <a16:creationId xmlns:a16="http://schemas.microsoft.com/office/drawing/2014/main" id="{9E9FCFCE-86B2-48E8-BCAE-9FCDAB546203}"/>
               </a:ext>
             </a:extLst>
           </p:cNvPr>
@@ -9132,8 +8682,8 @@
         </p:blipFill>
         <p:spPr bwMode="auto">
           <a:xfrm>
-            <a:off x="2604339" y="1493838"/>
-            <a:ext cx="6978559" cy="4351337"/>
+            <a:off x="415039" y="2951006"/>
+            <a:ext cx="5038725" cy="2228850"/>
           </a:xfrm>
           <a:prstGeom prst="rect">
             <a:avLst/>
@@ -9150,113 +8700,6 @@
           </a:extLst>
         </p:spPr>
       </p:pic>
-    </p:spTree>
-    <p:extLst>
-      <p:ext uri="{BB962C8B-B14F-4D97-AF65-F5344CB8AC3E}">
-        <p14:creationId xmlns:p14="http://schemas.microsoft.com/office/powerpoint/2010/main" val="790890651"/>
-      </p:ext>
-    </p:extLst>
-  </p:cSld>
-  <p:clrMapOvr>
-    <a:masterClrMapping/>
-  </p:clrMapOvr>
-</p:sld>
-</file>
-
-<file path=ppt/slides/slide4.xml><?xml version="1.0" encoding="utf-8"?>
-<p:sld xmlns:a="http://schemas.openxmlformats.org/drawingml/2006/main" xmlns:r="http://schemas.openxmlformats.org/officeDocument/2006/relationships" xmlns:p="http://schemas.openxmlformats.org/presentationml/2006/main">
-  <p:cSld>
-    <p:spTree>
-      <p:nvGrpSpPr>
-        <p:cNvPr id="1" name=""/>
-        <p:cNvGrpSpPr/>
-        <p:nvPr/>
-      </p:nvGrpSpPr>
-      <p:grpSpPr>
-        <a:xfrm>
-          <a:off x="0" y="0"/>
-          <a:ext cx="0" cy="0"/>
-          <a:chOff x="0" y="0"/>
-          <a:chExt cx="0" cy="0"/>
-        </a:xfrm>
-      </p:grpSpPr>
-      <p:sp>
-        <p:nvSpPr>
-          <p:cNvPr id="2" name="Title 1">
-            <a:extLst>
-              <a:ext uri="{FF2B5EF4-FFF2-40B4-BE49-F238E27FC236}">
-                <a16:creationId xmlns:a16="http://schemas.microsoft.com/office/drawing/2014/main" id="{0B62DCEB-3B64-4904-B9C1-F4D299416AFC}"/>
-              </a:ext>
-            </a:extLst>
-          </p:cNvPr>
-          <p:cNvSpPr>
-            <a:spLocks noGrp="1"/>
-          </p:cNvSpPr>
-          <p:nvPr>
-            <p:ph type="title"/>
-          </p:nvPr>
-        </p:nvSpPr>
-        <p:spPr/>
-        <p:txBody>
-          <a:bodyPr/>
-          <a:lstStyle/>
-          <a:p>
-            <a:r>
-              <a:rPr lang="en-US" dirty="0"/>
-              <a:t>Precision vs. Recall</a:t>
-            </a:r>
-          </a:p>
-        </p:txBody>
-      </p:sp>
-      <p:pic>
-        <p:nvPicPr>
-          <p:cNvPr id="1026" name="Picture 2" descr="enter image description here">
-            <a:extLst>
-              <a:ext uri="{FF2B5EF4-FFF2-40B4-BE49-F238E27FC236}">
-                <a16:creationId xmlns:a16="http://schemas.microsoft.com/office/drawing/2014/main" id="{9E9FCFCE-86B2-48E8-BCAE-9FCDAB546203}"/>
-              </a:ext>
-            </a:extLst>
-          </p:cNvPr>
-          <p:cNvPicPr>
-            <a:picLocks noGrp="1" noChangeAspect="1" noChangeArrowheads="1"/>
-          </p:cNvPicPr>
-          <p:nvPr>
-            <p:ph idx="1"/>
-          </p:nvPr>
-        </p:nvPicPr>
-        <p:blipFill>
-          <a:blip r:embed="rId2">
-            <a:extLst>
-              <a:ext uri="{28A0092B-C50C-407E-A947-70E740481C1C}">
-                <a14:useLocalDpi xmlns:a14="http://schemas.microsoft.com/office/drawing/2010/main" val="0"/>
-              </a:ext>
-            </a:extLst>
-          </a:blip>
-          <a:srcRect/>
-          <a:stretch>
-            <a:fillRect/>
-          </a:stretch>
-        </p:blipFill>
-        <p:spPr bwMode="auto">
-          <a:xfrm>
-            <a:off x="415039" y="2951006"/>
-            <a:ext cx="5038725" cy="2228850"/>
-          </a:xfrm>
-          <a:prstGeom prst="rect">
-            <a:avLst/>
-          </a:prstGeom>
-          <a:noFill/>
-          <a:extLst>
-            <a:ext uri="{909E8E84-426E-40DD-AFC4-6F175D3DCCD1}">
-              <a14:hiddenFill xmlns:a14="http://schemas.microsoft.com/office/drawing/2010/main">
-                <a:solidFill>
-                  <a:srgbClr val="FFFFFF"/>
-                </a:solidFill>
-              </a14:hiddenFill>
-            </a:ext>
-          </a:extLst>
-        </p:spPr>
-      </p:pic>
       <p:sp>
         <p:nvSpPr>
           <p:cNvPr id="4" name="TextBox 3">
@@ -9320,7 +8763,7 @@
 </p:sld>
 </file>
 
-<file path=ppt/slides/slide5.xml><?xml version="1.0" encoding="utf-8"?>
+<file path=ppt/slides/slide4.xml><?xml version="1.0" encoding="utf-8"?>
 <p:sld xmlns:a="http://schemas.openxmlformats.org/drawingml/2006/main" xmlns:r="http://schemas.openxmlformats.org/officeDocument/2006/relationships" xmlns:p="http://schemas.openxmlformats.org/presentationml/2006/main">
   <p:cSld>
     <p:spTree>

</xml_diff>